<commit_message>
started docs for class
</commit_message>
<xml_diff>
--- a/0data/more-slides.pptx
+++ b/0data/more-slides.pptx
@@ -4,12 +4,18 @@
   <p:sldMasterIdLst>
     <p:sldMasterId id="2147483660" r:id="rId1"/>
   </p:sldMasterIdLst>
+  <p:notesMasterIdLst>
+    <p:notesMasterId r:id="rId8"/>
+  </p:notesMasterIdLst>
   <p:sldIdLst>
-    <p:sldId id="257" r:id="rId2"/>
-    <p:sldId id="256" r:id="rId3"/>
-    <p:sldId id="258" r:id="rId4"/>
+    <p:sldId id="916" r:id="rId2"/>
+    <p:sldId id="1945" r:id="rId3"/>
+    <p:sldId id="257" r:id="rId4"/>
+    <p:sldId id="256" r:id="rId5"/>
+    <p:sldId id="258" r:id="rId6"/>
+    <p:sldId id="259" r:id="rId7"/>
   </p:sldIdLst>
-  <p:sldSz cx="9144000" cy="6858000" type="screen4x3"/>
+  <p:sldSz cx="12192000" cy="6858000"/>
   <p:notesSz cx="6858000" cy="9144000"/>
   <p:defaultTextStyle>
     <a:defPPr>
@@ -114,6 +120,541 @@
 </p:presentation>
 </file>
 
+<file path=ppt/notesMasters/notesMaster1.xml><?xml version="1.0" encoding="utf-8"?>
+<p:notesMaster xmlns:a="http://schemas.openxmlformats.org/drawingml/2006/main" xmlns:r="http://schemas.openxmlformats.org/officeDocument/2006/relationships" xmlns:p="http://schemas.openxmlformats.org/presentationml/2006/main">
+  <p:cSld>
+    <p:bg>
+      <p:bgRef idx="1001">
+        <a:schemeClr val="bg1"/>
+      </p:bgRef>
+    </p:bg>
+    <p:spTree>
+      <p:nvGrpSpPr>
+        <p:cNvPr id="1" name=""/>
+        <p:cNvGrpSpPr/>
+        <p:nvPr/>
+      </p:nvGrpSpPr>
+      <p:grpSpPr>
+        <a:xfrm>
+          <a:off x="0" y="0"/>
+          <a:ext cx="0" cy="0"/>
+          <a:chOff x="0" y="0"/>
+          <a:chExt cx="0" cy="0"/>
+        </a:xfrm>
+      </p:grpSpPr>
+      <p:sp>
+        <p:nvSpPr>
+          <p:cNvPr id="2" name="Header Placeholder 1"/>
+          <p:cNvSpPr>
+            <a:spLocks noGrp="1"/>
+          </p:cNvSpPr>
+          <p:nvPr>
+            <p:ph type="hdr" sz="quarter"/>
+          </p:nvPr>
+        </p:nvSpPr>
+        <p:spPr>
+          <a:xfrm>
+            <a:off x="0" y="0"/>
+            <a:ext cx="2971800" cy="458788"/>
+          </a:xfrm>
+          <a:prstGeom prst="rect">
+            <a:avLst/>
+          </a:prstGeom>
+        </p:spPr>
+        <p:txBody>
+          <a:bodyPr vert="horz" lIns="91440" tIns="45720" rIns="91440" bIns="45720" rtlCol="0"/>
+          <a:lstStyle>
+            <a:lvl1pPr algn="l">
+              <a:defRPr sz="1200"/>
+            </a:lvl1pPr>
+          </a:lstStyle>
+          <a:p>
+            <a:endParaRPr lang="en-US"/>
+          </a:p>
+        </p:txBody>
+      </p:sp>
+      <p:sp>
+        <p:nvSpPr>
+          <p:cNvPr id="3" name="Date Placeholder 2"/>
+          <p:cNvSpPr>
+            <a:spLocks noGrp="1"/>
+          </p:cNvSpPr>
+          <p:nvPr>
+            <p:ph type="dt" idx="1"/>
+          </p:nvPr>
+        </p:nvSpPr>
+        <p:spPr>
+          <a:xfrm>
+            <a:off x="3884613" y="0"/>
+            <a:ext cx="2971800" cy="458788"/>
+          </a:xfrm>
+          <a:prstGeom prst="rect">
+            <a:avLst/>
+          </a:prstGeom>
+        </p:spPr>
+        <p:txBody>
+          <a:bodyPr vert="horz" lIns="91440" tIns="45720" rIns="91440" bIns="45720" rtlCol="0"/>
+          <a:lstStyle>
+            <a:lvl1pPr algn="r">
+              <a:defRPr sz="1200"/>
+            </a:lvl1pPr>
+          </a:lstStyle>
+          <a:p>
+            <a:fld id="{DBDC82DA-FED0-4493-8EAD-89C027ED11D5}" type="datetimeFigureOut">
+              <a:rPr lang="en-US" smtClean="0"/>
+              <a:t>8/30/2023</a:t>
+            </a:fld>
+            <a:endParaRPr lang="en-US"/>
+          </a:p>
+        </p:txBody>
+      </p:sp>
+      <p:sp>
+        <p:nvSpPr>
+          <p:cNvPr id="4" name="Slide Image Placeholder 3"/>
+          <p:cNvSpPr>
+            <a:spLocks noGrp="1" noRot="1" noChangeAspect="1"/>
+          </p:cNvSpPr>
+          <p:nvPr>
+            <p:ph type="sldImg" idx="2"/>
+          </p:nvPr>
+        </p:nvSpPr>
+        <p:spPr>
+          <a:xfrm>
+            <a:off x="685800" y="1143000"/>
+            <a:ext cx="5486400" cy="3086100"/>
+          </a:xfrm>
+          <a:prstGeom prst="rect">
+            <a:avLst/>
+          </a:prstGeom>
+          <a:noFill/>
+          <a:ln w="12700">
+            <a:solidFill>
+              <a:prstClr val="black"/>
+            </a:solidFill>
+          </a:ln>
+        </p:spPr>
+        <p:txBody>
+          <a:bodyPr vert="horz" lIns="91440" tIns="45720" rIns="91440" bIns="45720" rtlCol="0" anchor="ctr"/>
+          <a:lstStyle/>
+          <a:p>
+            <a:endParaRPr lang="en-US"/>
+          </a:p>
+        </p:txBody>
+      </p:sp>
+      <p:sp>
+        <p:nvSpPr>
+          <p:cNvPr id="5" name="Notes Placeholder 4"/>
+          <p:cNvSpPr>
+            <a:spLocks noGrp="1"/>
+          </p:cNvSpPr>
+          <p:nvPr>
+            <p:ph type="body" sz="quarter" idx="3"/>
+          </p:nvPr>
+        </p:nvSpPr>
+        <p:spPr>
+          <a:xfrm>
+            <a:off x="685800" y="4400550"/>
+            <a:ext cx="5486400" cy="3600450"/>
+          </a:xfrm>
+          <a:prstGeom prst="rect">
+            <a:avLst/>
+          </a:prstGeom>
+        </p:spPr>
+        <p:txBody>
+          <a:bodyPr vert="horz" lIns="91440" tIns="45720" rIns="91440" bIns="45720" rtlCol="0"/>
+          <a:lstStyle/>
+          <a:p>
+            <a:pPr lvl="0"/>
+            <a:r>
+              <a:rPr lang="en-US"/>
+              <a:t>Click to edit Master text styles</a:t>
+            </a:r>
+          </a:p>
+          <a:p>
+            <a:pPr lvl="1"/>
+            <a:r>
+              <a:rPr lang="en-US"/>
+              <a:t>Second level</a:t>
+            </a:r>
+          </a:p>
+          <a:p>
+            <a:pPr lvl="2"/>
+            <a:r>
+              <a:rPr lang="en-US"/>
+              <a:t>Third level</a:t>
+            </a:r>
+          </a:p>
+          <a:p>
+            <a:pPr lvl="3"/>
+            <a:r>
+              <a:rPr lang="en-US"/>
+              <a:t>Fourth level</a:t>
+            </a:r>
+          </a:p>
+          <a:p>
+            <a:pPr lvl="4"/>
+            <a:r>
+              <a:rPr lang="en-US"/>
+              <a:t>Fifth level</a:t>
+            </a:r>
+          </a:p>
+        </p:txBody>
+      </p:sp>
+      <p:sp>
+        <p:nvSpPr>
+          <p:cNvPr id="6" name="Footer Placeholder 5"/>
+          <p:cNvSpPr>
+            <a:spLocks noGrp="1"/>
+          </p:cNvSpPr>
+          <p:nvPr>
+            <p:ph type="ftr" sz="quarter" idx="4"/>
+          </p:nvPr>
+        </p:nvSpPr>
+        <p:spPr>
+          <a:xfrm>
+            <a:off x="0" y="8685213"/>
+            <a:ext cx="2971800" cy="458787"/>
+          </a:xfrm>
+          <a:prstGeom prst="rect">
+            <a:avLst/>
+          </a:prstGeom>
+        </p:spPr>
+        <p:txBody>
+          <a:bodyPr vert="horz" lIns="91440" tIns="45720" rIns="91440" bIns="45720" rtlCol="0" anchor="b"/>
+          <a:lstStyle>
+            <a:lvl1pPr algn="l">
+              <a:defRPr sz="1200"/>
+            </a:lvl1pPr>
+          </a:lstStyle>
+          <a:p>
+            <a:endParaRPr lang="en-US"/>
+          </a:p>
+        </p:txBody>
+      </p:sp>
+      <p:sp>
+        <p:nvSpPr>
+          <p:cNvPr id="7" name="Slide Number Placeholder 6"/>
+          <p:cNvSpPr>
+            <a:spLocks noGrp="1"/>
+          </p:cNvSpPr>
+          <p:nvPr>
+            <p:ph type="sldNum" sz="quarter" idx="5"/>
+          </p:nvPr>
+        </p:nvSpPr>
+        <p:spPr>
+          <a:xfrm>
+            <a:off x="3884613" y="8685213"/>
+            <a:ext cx="2971800" cy="458787"/>
+          </a:xfrm>
+          <a:prstGeom prst="rect">
+            <a:avLst/>
+          </a:prstGeom>
+        </p:spPr>
+        <p:txBody>
+          <a:bodyPr vert="horz" lIns="91440" tIns="45720" rIns="91440" bIns="45720" rtlCol="0" anchor="b"/>
+          <a:lstStyle>
+            <a:lvl1pPr algn="r">
+              <a:defRPr sz="1200"/>
+            </a:lvl1pPr>
+          </a:lstStyle>
+          <a:p>
+            <a:fld id="{6D621340-7FB5-4065-8163-2CA78F268B9C}" type="slidenum">
+              <a:rPr lang="en-US" smtClean="0"/>
+              <a:t>‹#›</a:t>
+            </a:fld>
+            <a:endParaRPr lang="en-US"/>
+          </a:p>
+        </p:txBody>
+      </p:sp>
+    </p:spTree>
+    <p:extLst>
+      <p:ext uri="{BB962C8B-B14F-4D97-AF65-F5344CB8AC3E}">
+        <p14:creationId xmlns:p14="http://schemas.microsoft.com/office/powerpoint/2010/main" val="3170028000"/>
+      </p:ext>
+    </p:extLst>
+  </p:cSld>
+  <p:clrMap bg1="lt1" tx1="dk1" bg2="lt2" tx2="dk2" accent1="accent1" accent2="accent2" accent3="accent3" accent4="accent4" accent5="accent5" accent6="accent6" hlink="hlink" folHlink="folHlink"/>
+  <p:notesStyle>
+    <a:lvl1pPr marL="0" algn="l" defTabSz="914400" rtl="0" eaLnBrk="1" latinLnBrk="0" hangingPunct="1">
+      <a:defRPr sz="1200" kern="1200">
+        <a:solidFill>
+          <a:schemeClr val="tx1"/>
+        </a:solidFill>
+        <a:latin typeface="+mn-lt"/>
+        <a:ea typeface="+mn-ea"/>
+        <a:cs typeface="+mn-cs"/>
+      </a:defRPr>
+    </a:lvl1pPr>
+    <a:lvl2pPr marL="457200" algn="l" defTabSz="914400" rtl="0" eaLnBrk="1" latinLnBrk="0" hangingPunct="1">
+      <a:defRPr sz="1200" kern="1200">
+        <a:solidFill>
+          <a:schemeClr val="tx1"/>
+        </a:solidFill>
+        <a:latin typeface="+mn-lt"/>
+        <a:ea typeface="+mn-ea"/>
+        <a:cs typeface="+mn-cs"/>
+      </a:defRPr>
+    </a:lvl2pPr>
+    <a:lvl3pPr marL="914400" algn="l" defTabSz="914400" rtl="0" eaLnBrk="1" latinLnBrk="0" hangingPunct="1">
+      <a:defRPr sz="1200" kern="1200">
+        <a:solidFill>
+          <a:schemeClr val="tx1"/>
+        </a:solidFill>
+        <a:latin typeface="+mn-lt"/>
+        <a:ea typeface="+mn-ea"/>
+        <a:cs typeface="+mn-cs"/>
+      </a:defRPr>
+    </a:lvl3pPr>
+    <a:lvl4pPr marL="1371600" algn="l" defTabSz="914400" rtl="0" eaLnBrk="1" latinLnBrk="0" hangingPunct="1">
+      <a:defRPr sz="1200" kern="1200">
+        <a:solidFill>
+          <a:schemeClr val="tx1"/>
+        </a:solidFill>
+        <a:latin typeface="+mn-lt"/>
+        <a:ea typeface="+mn-ea"/>
+        <a:cs typeface="+mn-cs"/>
+      </a:defRPr>
+    </a:lvl4pPr>
+    <a:lvl5pPr marL="1828800" algn="l" defTabSz="914400" rtl="0" eaLnBrk="1" latinLnBrk="0" hangingPunct="1">
+      <a:defRPr sz="1200" kern="1200">
+        <a:solidFill>
+          <a:schemeClr val="tx1"/>
+        </a:solidFill>
+        <a:latin typeface="+mn-lt"/>
+        <a:ea typeface="+mn-ea"/>
+        <a:cs typeface="+mn-cs"/>
+      </a:defRPr>
+    </a:lvl5pPr>
+    <a:lvl6pPr marL="2286000" algn="l" defTabSz="914400" rtl="0" eaLnBrk="1" latinLnBrk="0" hangingPunct="1">
+      <a:defRPr sz="1200" kern="1200">
+        <a:solidFill>
+          <a:schemeClr val="tx1"/>
+        </a:solidFill>
+        <a:latin typeface="+mn-lt"/>
+        <a:ea typeface="+mn-ea"/>
+        <a:cs typeface="+mn-cs"/>
+      </a:defRPr>
+    </a:lvl6pPr>
+    <a:lvl7pPr marL="2743200" algn="l" defTabSz="914400" rtl="0" eaLnBrk="1" latinLnBrk="0" hangingPunct="1">
+      <a:defRPr sz="1200" kern="1200">
+        <a:solidFill>
+          <a:schemeClr val="tx1"/>
+        </a:solidFill>
+        <a:latin typeface="+mn-lt"/>
+        <a:ea typeface="+mn-ea"/>
+        <a:cs typeface="+mn-cs"/>
+      </a:defRPr>
+    </a:lvl7pPr>
+    <a:lvl8pPr marL="3200400" algn="l" defTabSz="914400" rtl="0" eaLnBrk="1" latinLnBrk="0" hangingPunct="1">
+      <a:defRPr sz="1200" kern="1200">
+        <a:solidFill>
+          <a:schemeClr val="tx1"/>
+        </a:solidFill>
+        <a:latin typeface="+mn-lt"/>
+        <a:ea typeface="+mn-ea"/>
+        <a:cs typeface="+mn-cs"/>
+      </a:defRPr>
+    </a:lvl8pPr>
+    <a:lvl9pPr marL="3657600" algn="l" defTabSz="914400" rtl="0" eaLnBrk="1" latinLnBrk="0" hangingPunct="1">
+      <a:defRPr sz="1200" kern="1200">
+        <a:solidFill>
+          <a:schemeClr val="tx1"/>
+        </a:solidFill>
+        <a:latin typeface="+mn-lt"/>
+        <a:ea typeface="+mn-ea"/>
+        <a:cs typeface="+mn-cs"/>
+      </a:defRPr>
+    </a:lvl9pPr>
+  </p:notesStyle>
+</p:notesMaster>
+</file>
+
+<file path=ppt/notesSlides/notesSlide1.xml><?xml version="1.0" encoding="utf-8"?>
+<p:notes xmlns:a="http://schemas.openxmlformats.org/drawingml/2006/main" xmlns:r="http://schemas.openxmlformats.org/officeDocument/2006/relationships" xmlns:p="http://schemas.openxmlformats.org/presentationml/2006/main">
+  <p:cSld>
+    <p:spTree>
+      <p:nvGrpSpPr>
+        <p:cNvPr id="1" name=""/>
+        <p:cNvGrpSpPr/>
+        <p:nvPr/>
+      </p:nvGrpSpPr>
+      <p:grpSpPr>
+        <a:xfrm>
+          <a:off x="0" y="0"/>
+          <a:ext cx="0" cy="0"/>
+          <a:chOff x="0" y="0"/>
+          <a:chExt cx="0" cy="0"/>
+        </a:xfrm>
+      </p:grpSpPr>
+      <p:sp>
+        <p:nvSpPr>
+          <p:cNvPr id="2" name="Slide Image Placeholder 1"/>
+          <p:cNvSpPr>
+            <a:spLocks noGrp="1" noRot="1" noChangeAspect="1"/>
+          </p:cNvSpPr>
+          <p:nvPr>
+            <p:ph type="sldImg"/>
+          </p:nvPr>
+        </p:nvSpPr>
+        <p:spPr/>
+      </p:sp>
+      <p:sp>
+        <p:nvSpPr>
+          <p:cNvPr id="3" name="Notes Placeholder 2"/>
+          <p:cNvSpPr>
+            <a:spLocks noGrp="1"/>
+          </p:cNvSpPr>
+          <p:nvPr>
+            <p:ph type="body" idx="1"/>
+          </p:nvPr>
+        </p:nvSpPr>
+        <p:spPr/>
+        <p:txBody>
+          <a:bodyPr/>
+          <a:lstStyle/>
+          <a:p>
+            <a:r>
+              <a:rPr lang="en-US" dirty="0"/>
+              <a:t>25 minute talk</a:t>
+            </a:r>
+          </a:p>
+          <a:p>
+            <a:endParaRPr lang="en-US" dirty="0"/>
+          </a:p>
+        </p:txBody>
+      </p:sp>
+      <p:sp>
+        <p:nvSpPr>
+          <p:cNvPr id="4" name="Slide Number Placeholder 3"/>
+          <p:cNvSpPr>
+            <a:spLocks noGrp="1"/>
+          </p:cNvSpPr>
+          <p:nvPr>
+            <p:ph type="sldNum" sz="quarter" idx="10"/>
+          </p:nvPr>
+        </p:nvSpPr>
+        <p:spPr/>
+        <p:txBody>
+          <a:bodyPr/>
+          <a:lstStyle/>
+          <a:p>
+            <a:pPr>
+              <a:defRPr/>
+            </a:pPr>
+            <a:fld id="{0518F3B7-3696-45BF-AF4C-73856AD7B843}" type="slidenum">
+              <a:rPr lang="en-SG" smtClean="0"/>
+              <a:pPr>
+                <a:defRPr/>
+              </a:pPr>
+              <a:t>1</a:t>
+            </a:fld>
+            <a:endParaRPr lang="en-SG"/>
+          </a:p>
+        </p:txBody>
+      </p:sp>
+    </p:spTree>
+    <p:extLst>
+      <p:ext uri="{BB962C8B-B14F-4D97-AF65-F5344CB8AC3E}">
+        <p14:creationId xmlns:p14="http://schemas.microsoft.com/office/powerpoint/2010/main" val="142256030"/>
+      </p:ext>
+    </p:extLst>
+  </p:cSld>
+  <p:clrMapOvr>
+    <a:masterClrMapping/>
+  </p:clrMapOvr>
+</p:notes>
+</file>
+
+<file path=ppt/notesSlides/notesSlide2.xml><?xml version="1.0" encoding="utf-8"?>
+<p:notes xmlns:a="http://schemas.openxmlformats.org/drawingml/2006/main" xmlns:r="http://schemas.openxmlformats.org/officeDocument/2006/relationships" xmlns:p="http://schemas.openxmlformats.org/presentationml/2006/main">
+  <p:cSld>
+    <p:spTree>
+      <p:nvGrpSpPr>
+        <p:cNvPr id="1" name=""/>
+        <p:cNvGrpSpPr/>
+        <p:nvPr/>
+      </p:nvGrpSpPr>
+      <p:grpSpPr>
+        <a:xfrm>
+          <a:off x="0" y="0"/>
+          <a:ext cx="0" cy="0"/>
+          <a:chOff x="0" y="0"/>
+          <a:chExt cx="0" cy="0"/>
+        </a:xfrm>
+      </p:grpSpPr>
+      <p:sp>
+        <p:nvSpPr>
+          <p:cNvPr id="2" name="Slide Image Placeholder 1"/>
+          <p:cNvSpPr>
+            <a:spLocks noGrp="1" noRot="1" noChangeAspect="1"/>
+          </p:cNvSpPr>
+          <p:nvPr>
+            <p:ph type="sldImg"/>
+          </p:nvPr>
+        </p:nvSpPr>
+        <p:spPr/>
+      </p:sp>
+      <p:sp>
+        <p:nvSpPr>
+          <p:cNvPr id="3" name="Notes Placeholder 2"/>
+          <p:cNvSpPr>
+            <a:spLocks noGrp="1"/>
+          </p:cNvSpPr>
+          <p:nvPr>
+            <p:ph type="body" idx="1"/>
+          </p:nvPr>
+        </p:nvSpPr>
+        <p:spPr/>
+        <p:txBody>
+          <a:bodyPr/>
+          <a:lstStyle/>
+          <a:p>
+            <a:endParaRPr lang="en-US" dirty="0"/>
+          </a:p>
+        </p:txBody>
+      </p:sp>
+      <p:sp>
+        <p:nvSpPr>
+          <p:cNvPr id="4" name="Slide Number Placeholder 3"/>
+          <p:cNvSpPr>
+            <a:spLocks noGrp="1"/>
+          </p:cNvSpPr>
+          <p:nvPr>
+            <p:ph type="sldNum" sz="quarter" idx="5"/>
+          </p:nvPr>
+        </p:nvSpPr>
+        <p:spPr/>
+        <p:txBody>
+          <a:bodyPr/>
+          <a:lstStyle/>
+          <a:p>
+            <a:pPr>
+              <a:defRPr/>
+            </a:pPr>
+            <a:fld id="{0518F3B7-3696-45BF-AF4C-73856AD7B843}" type="slidenum">
+              <a:rPr lang="en-SG" smtClean="0"/>
+              <a:pPr>
+                <a:defRPr/>
+              </a:pPr>
+              <a:t>2</a:t>
+            </a:fld>
+            <a:endParaRPr lang="en-SG"/>
+          </a:p>
+        </p:txBody>
+      </p:sp>
+    </p:spTree>
+    <p:extLst>
+      <p:ext uri="{BB962C8B-B14F-4D97-AF65-F5344CB8AC3E}">
+        <p14:creationId xmlns:p14="http://schemas.microsoft.com/office/powerpoint/2010/main" val="389612735"/>
+      </p:ext>
+    </p:extLst>
+  </p:cSld>
+  <p:clrMapOvr>
+    <a:masterClrMapping/>
+  </p:clrMapOvr>
+</p:notes>
+</file>
+
 <file path=ppt/slideLayouts/slideLayout1.xml><?xml version="1.0" encoding="utf-8"?>
 <p:sldLayout xmlns:a="http://schemas.openxmlformats.org/drawingml/2006/main" xmlns:r="http://schemas.openxmlformats.org/officeDocument/2006/relationships" xmlns:p="http://schemas.openxmlformats.org/presentationml/2006/main" type="title" preserve="1">
   <p:cSld name="Title Slide">
@@ -143,8 +684,8 @@
         </p:nvSpPr>
         <p:spPr>
           <a:xfrm>
-            <a:off x="685800" y="1122363"/>
-            <a:ext cx="7772400" cy="2387600"/>
+            <a:off x="914400" y="1122363"/>
+            <a:ext cx="10363200" cy="2387600"/>
           </a:xfrm>
         </p:spPr>
         <p:txBody>
@@ -175,8 +716,8 @@
         </p:nvSpPr>
         <p:spPr>
           <a:xfrm>
-            <a:off x="1143000" y="3602038"/>
-            <a:ext cx="6858000" cy="1655762"/>
+            <a:off x="1524000" y="3602038"/>
+            <a:ext cx="9144000" cy="1655762"/>
           </a:xfrm>
         </p:spPr>
         <p:txBody>
@@ -505,8 +1046,8 @@
         </p:nvSpPr>
         <p:spPr>
           <a:xfrm>
-            <a:off x="6543675" y="365125"/>
-            <a:ext cx="1971675" cy="5811838"/>
+            <a:off x="8724901" y="365125"/>
+            <a:ext cx="2628900" cy="5811838"/>
           </a:xfrm>
         </p:spPr>
         <p:txBody>
@@ -533,8 +1074,8 @@
         </p:nvSpPr>
         <p:spPr>
           <a:xfrm>
-            <a:off x="628650" y="365125"/>
-            <a:ext cx="5800725" cy="5811838"/>
+            <a:off x="838201" y="365125"/>
+            <a:ext cx="7734300" cy="5811838"/>
           </a:xfrm>
         </p:spPr>
         <p:txBody>
@@ -855,8 +1396,8 @@
         </p:nvSpPr>
         <p:spPr>
           <a:xfrm>
-            <a:off x="623888" y="1709739"/>
-            <a:ext cx="7886700" cy="2852737"/>
+            <a:off x="831851" y="1709740"/>
+            <a:ext cx="10515600" cy="2852737"/>
           </a:xfrm>
         </p:spPr>
         <p:txBody>
@@ -887,8 +1428,8 @@
         </p:nvSpPr>
         <p:spPr>
           <a:xfrm>
-            <a:off x="623888" y="4589464"/>
-            <a:ext cx="7886700" cy="1500187"/>
+            <a:off x="831851" y="4589465"/>
+            <a:ext cx="10515600" cy="1500187"/>
           </a:xfrm>
         </p:spPr>
         <p:txBody>
@@ -1122,8 +1663,8 @@
         </p:nvSpPr>
         <p:spPr>
           <a:xfrm>
-            <a:off x="628650" y="1825625"/>
-            <a:ext cx="3886200" cy="4351338"/>
+            <a:off x="838200" y="1825625"/>
+            <a:ext cx="5181600" cy="4351338"/>
           </a:xfrm>
         </p:spPr>
         <p:txBody>
@@ -1179,8 +1720,8 @@
         </p:nvSpPr>
         <p:spPr>
           <a:xfrm>
-            <a:off x="4629150" y="1825625"/>
-            <a:ext cx="3886200" cy="4351338"/>
+            <a:off x="6172200" y="1825625"/>
+            <a:ext cx="5181600" cy="4351338"/>
           </a:xfrm>
         </p:spPr>
         <p:txBody>
@@ -1331,8 +1872,8 @@
         </p:nvSpPr>
         <p:spPr>
           <a:xfrm>
-            <a:off x="629841" y="365126"/>
-            <a:ext cx="7886700" cy="1325563"/>
+            <a:off x="839788" y="365127"/>
+            <a:ext cx="10515600" cy="1325563"/>
           </a:xfrm>
         </p:spPr>
         <p:txBody>
@@ -1359,8 +1900,8 @@
         </p:nvSpPr>
         <p:spPr>
           <a:xfrm>
-            <a:off x="629842" y="1681163"/>
-            <a:ext cx="3868340" cy="823912"/>
+            <a:off x="839789" y="1681163"/>
+            <a:ext cx="5157787" cy="823912"/>
           </a:xfrm>
         </p:spPr>
         <p:txBody>
@@ -1424,8 +1965,8 @@
         </p:nvSpPr>
         <p:spPr>
           <a:xfrm>
-            <a:off x="629842" y="2505075"/>
-            <a:ext cx="3868340" cy="3684588"/>
+            <a:off x="839789" y="2505075"/>
+            <a:ext cx="5157787" cy="3684588"/>
           </a:xfrm>
         </p:spPr>
         <p:txBody>
@@ -1481,8 +2022,8 @@
         </p:nvSpPr>
         <p:spPr>
           <a:xfrm>
-            <a:off x="4629150" y="1681163"/>
-            <a:ext cx="3887391" cy="823912"/>
+            <a:off x="6172201" y="1681163"/>
+            <a:ext cx="5183188" cy="823912"/>
           </a:xfrm>
         </p:spPr>
         <p:txBody>
@@ -1546,8 +2087,8 @@
         </p:nvSpPr>
         <p:spPr>
           <a:xfrm>
-            <a:off x="4629150" y="2505075"/>
-            <a:ext cx="3887391" cy="3684588"/>
+            <a:off x="6172201" y="2505075"/>
+            <a:ext cx="5183188" cy="3684588"/>
           </a:xfrm>
         </p:spPr>
         <p:txBody>
@@ -1911,8 +2452,8 @@
         </p:nvSpPr>
         <p:spPr>
           <a:xfrm>
-            <a:off x="629841" y="457200"/>
-            <a:ext cx="2949178" cy="1600200"/>
+            <a:off x="839788" y="457200"/>
+            <a:ext cx="3932237" cy="1600200"/>
           </a:xfrm>
         </p:spPr>
         <p:txBody>
@@ -1943,8 +2484,8 @@
         </p:nvSpPr>
         <p:spPr>
           <a:xfrm>
-            <a:off x="3887391" y="987426"/>
-            <a:ext cx="4629150" cy="4873625"/>
+            <a:off x="5183188" y="987427"/>
+            <a:ext cx="6172200" cy="4873625"/>
           </a:xfrm>
         </p:spPr>
         <p:txBody>
@@ -2028,8 +2569,8 @@
         </p:nvSpPr>
         <p:spPr>
           <a:xfrm>
-            <a:off x="629841" y="2057400"/>
-            <a:ext cx="2949178" cy="3811588"/>
+            <a:off x="839788" y="2057400"/>
+            <a:ext cx="3932237" cy="3811588"/>
           </a:xfrm>
         </p:spPr>
         <p:txBody>
@@ -2188,8 +2729,8 @@
         </p:nvSpPr>
         <p:spPr>
           <a:xfrm>
-            <a:off x="629841" y="457200"/>
-            <a:ext cx="2949178" cy="1600200"/>
+            <a:off x="839788" y="457200"/>
+            <a:ext cx="3932237" cy="1600200"/>
           </a:xfrm>
         </p:spPr>
         <p:txBody>
@@ -2220,8 +2761,8 @@
         </p:nvSpPr>
         <p:spPr>
           <a:xfrm>
-            <a:off x="3887391" y="987426"/>
-            <a:ext cx="4629150" cy="4873625"/>
+            <a:off x="5183188" y="987427"/>
+            <a:ext cx="6172200" cy="4873625"/>
           </a:xfrm>
         </p:spPr>
         <p:txBody>
@@ -2285,8 +2826,8 @@
         </p:nvSpPr>
         <p:spPr>
           <a:xfrm>
-            <a:off x="629841" y="2057400"/>
-            <a:ext cx="2949178" cy="3811588"/>
+            <a:off x="839788" y="2057400"/>
+            <a:ext cx="3932237" cy="3811588"/>
           </a:xfrm>
         </p:spPr>
         <p:txBody>
@@ -2450,8 +2991,8 @@
         </p:nvSpPr>
         <p:spPr>
           <a:xfrm>
-            <a:off x="628650" y="365126"/>
-            <a:ext cx="7886700" cy="1325563"/>
+            <a:off x="838200" y="365127"/>
+            <a:ext cx="10515600" cy="1325563"/>
           </a:xfrm>
           <a:prstGeom prst="rect">
             <a:avLst/>
@@ -2483,8 +3024,8 @@
         </p:nvSpPr>
         <p:spPr>
           <a:xfrm>
-            <a:off x="628650" y="1825625"/>
-            <a:ext cx="7886700" cy="4351338"/>
+            <a:off x="838200" y="1825625"/>
+            <a:ext cx="10515600" cy="4351338"/>
           </a:xfrm>
           <a:prstGeom prst="rect">
             <a:avLst/>
@@ -2545,8 +3086,8 @@
         </p:nvSpPr>
         <p:spPr>
           <a:xfrm>
-            <a:off x="628650" y="6356351"/>
-            <a:ext cx="2057400" cy="365125"/>
+            <a:off x="838200" y="6356352"/>
+            <a:ext cx="2743200" cy="365125"/>
           </a:xfrm>
           <a:prstGeom prst="rect">
             <a:avLst/>
@@ -2586,8 +3127,8 @@
         </p:nvSpPr>
         <p:spPr>
           <a:xfrm>
-            <a:off x="3028950" y="6356351"/>
-            <a:ext cx="3086100" cy="365125"/>
+            <a:off x="4038600" y="6356352"/>
+            <a:ext cx="4114800" cy="365125"/>
           </a:xfrm>
           <a:prstGeom prst="rect">
             <a:avLst/>
@@ -2623,8 +3164,8 @@
         </p:nvSpPr>
         <p:spPr>
           <a:xfrm>
-            <a:off x="6457950" y="6356351"/>
-            <a:ext cx="2057400" cy="365125"/>
+            <a:off x="8610600" y="6356352"/>
+            <a:ext cx="2743200" cy="365125"/>
           </a:xfrm>
           <a:prstGeom prst="rect">
             <a:avLst/>
@@ -2975,6 +3516,820 @@
       </p:grpSpPr>
       <p:sp>
         <p:nvSpPr>
+          <p:cNvPr id="5" name="Title 4"/>
+          <p:cNvSpPr>
+            <a:spLocks noGrp="1"/>
+          </p:cNvSpPr>
+          <p:nvPr>
+            <p:ph type="ctrTitle"/>
+          </p:nvPr>
+        </p:nvSpPr>
+        <p:spPr>
+          <a:xfrm>
+            <a:off x="496958" y="369333"/>
+            <a:ext cx="10363200" cy="1070361"/>
+          </a:xfrm>
+        </p:spPr>
+        <p:txBody>
+          <a:bodyPr>
+            <a:normAutofit/>
+          </a:bodyPr>
+          <a:lstStyle/>
+          <a:p>
+            <a:pPr algn="l"/>
+            <a:r>
+              <a:rPr lang="en-US" sz="3200" dirty="0"/>
+              <a:t>Single cell RNA-seq analysis workshop at </a:t>
+            </a:r>
+            <a:br>
+              <a:rPr lang="en-US" sz="3200" dirty="0"/>
+            </a:br>
+            <a:r>
+              <a:rPr lang="en-US" sz="3200" dirty="0"/>
+              <a:t>Chang Gung University Molecular Medicine Research Center </a:t>
+            </a:r>
+          </a:p>
+        </p:txBody>
+      </p:sp>
+      <p:sp>
+        <p:nvSpPr>
+          <p:cNvPr id="7" name="Subtitle 6">
+            <a:extLst>
+              <a:ext uri="{FF2B5EF4-FFF2-40B4-BE49-F238E27FC236}">
+                <a16:creationId xmlns:a16="http://schemas.microsoft.com/office/drawing/2014/main" id="{42932B11-9EE9-4B96-A336-1693F168355A}"/>
+              </a:ext>
+            </a:extLst>
+          </p:cNvPr>
+          <p:cNvSpPr>
+            <a:spLocks noGrp="1"/>
+          </p:cNvSpPr>
+          <p:nvPr>
+            <p:ph type="subTitle" idx="1"/>
+          </p:nvPr>
+        </p:nvSpPr>
+        <p:spPr>
+          <a:xfrm>
+            <a:off x="648855" y="2470666"/>
+            <a:ext cx="10615775" cy="3244333"/>
+          </a:xfrm>
+        </p:spPr>
+        <p:txBody>
+          <a:bodyPr>
+            <a:normAutofit fontScale="92500"/>
+          </a:bodyPr>
+          <a:lstStyle/>
+          <a:p>
+            <a:pPr algn="l"/>
+            <a:r>
+              <a:rPr lang="en-US" sz="2800" dirty="0"/>
+              <a:t>Steven G. Rozen </a:t>
+            </a:r>
+          </a:p>
+          <a:p>
+            <a:pPr algn="l"/>
+            <a:r>
+              <a:rPr lang="en-US" sz="2800" dirty="0"/>
+              <a:t>with contributions from Ian Zhang, Chen-Yang Huang, Yinuo Zhang, and Yi Xie</a:t>
+            </a:r>
+          </a:p>
+          <a:p>
+            <a:pPr algn="l"/>
+            <a:endParaRPr lang="en-US" sz="2400" dirty="0"/>
+          </a:p>
+          <a:p>
+            <a:pPr algn="l"/>
+            <a:r>
+              <a:rPr lang="en-US" sz="2400" dirty="0"/>
+              <a:t>steverozen@pm.me</a:t>
+            </a:r>
+          </a:p>
+          <a:p>
+            <a:pPr algn="l"/>
+            <a:r>
+              <a:rPr lang="en-US" sz="2400" dirty="0"/>
+              <a:t>August 29 to September 5, 2023</a:t>
+            </a:r>
+          </a:p>
+          <a:p>
+            <a:pPr algn="l"/>
+            <a:endParaRPr lang="en-US" sz="2400" dirty="0"/>
+          </a:p>
+          <a:p>
+            <a:pPr algn="l"/>
+            <a:r>
+              <a:rPr lang="en-US" sz="2400"/>
+              <a:t>Slides at https</a:t>
+            </a:r>
+            <a:r>
+              <a:rPr lang="en-US" sz="2400" dirty="0"/>
+              <a:t>://github.com/Rozen-Lab/msigs</a:t>
+            </a:r>
+          </a:p>
+          <a:p>
+            <a:pPr algn="l"/>
+            <a:endParaRPr lang="en-SG" sz="2400" dirty="0"/>
+          </a:p>
+        </p:txBody>
+      </p:sp>
+      <p:sp>
+        <p:nvSpPr>
+          <p:cNvPr id="4" name="Slide Number Placeholder 3"/>
+          <p:cNvSpPr>
+            <a:spLocks noGrp="1"/>
+          </p:cNvSpPr>
+          <p:nvPr>
+            <p:ph type="sldNum" sz="quarter" idx="12"/>
+          </p:nvPr>
+        </p:nvSpPr>
+        <p:spPr/>
+        <p:txBody>
+          <a:bodyPr/>
+          <a:lstStyle/>
+          <a:p>
+            <a:pPr>
+              <a:defRPr/>
+            </a:pPr>
+            <a:fld id="{FFFB4C55-9A55-45A0-A2A5-ECC3126D7CB8}" type="slidenum">
+              <a:rPr lang="en-US" smtClean="0"/>
+              <a:pPr>
+                <a:defRPr/>
+              </a:pPr>
+              <a:t>1</a:t>
+            </a:fld>
+            <a:endParaRPr lang="en-US" dirty="0"/>
+          </a:p>
+        </p:txBody>
+      </p:sp>
+      <p:sp>
+        <p:nvSpPr>
+          <p:cNvPr id="2" name="Rectangle 1"/>
+          <p:cNvSpPr>
+            <a:spLocks noChangeArrowheads="1"/>
+          </p:cNvSpPr>
+          <p:nvPr/>
+        </p:nvSpPr>
+        <p:spPr bwMode="auto">
+          <a:xfrm>
+            <a:off x="1524000" y="-184666"/>
+            <a:ext cx="312906" cy="369332"/>
+          </a:xfrm>
+          <a:prstGeom prst="rect">
+            <a:avLst/>
+          </a:prstGeom>
+          <a:noFill/>
+          <a:ln>
+            <a:noFill/>
+          </a:ln>
+          <a:effectLst/>
+          <a:extLst>
+            <a:ext uri="{909E8E84-426E-40DD-AFC4-6F175D3DCCD1}">
+              <a14:hiddenFill xmlns:a14="http://schemas.microsoft.com/office/drawing/2010/main">
+                <a:solidFill>
+                  <a:schemeClr val="accent1"/>
+                </a:solidFill>
+              </a14:hiddenFill>
+            </a:ext>
+            <a:ext uri="{91240B29-F687-4F45-9708-019B960494DF}">
+              <a14:hiddenLine xmlns:a14="http://schemas.microsoft.com/office/drawing/2010/main" w="9525">
+                <a:solidFill>
+                  <a:schemeClr val="tx1"/>
+                </a:solidFill>
+                <a:miter lim="800000"/>
+                <a:headEnd/>
+                <a:tailEnd/>
+              </a14:hiddenLine>
+            </a:ext>
+            <a:ext uri="{AF507438-7753-43E0-B8FC-AC1667EBCBE1}">
+              <a14:hiddenEffects xmlns:a14="http://schemas.microsoft.com/office/drawing/2010/main">
+                <a:effectLst>
+                  <a:outerShdw dist="35921" dir="2700000" algn="ctr" rotWithShape="0">
+                    <a:schemeClr val="bg2"/>
+                  </a:outerShdw>
+                </a:effectLst>
+              </a14:hiddenEffects>
+            </a:ext>
+          </a:extLst>
+        </p:spPr>
+        <p:txBody>
+          <a:bodyPr vert="horz" wrap="none" lIns="91440" tIns="45720" rIns="91440" bIns="45720" numCol="1" anchor="ctr" anchorCtr="0" compatLnSpc="1">
+            <a:prstTxWarp prst="textNoShape">
+              <a:avLst/>
+            </a:prstTxWarp>
+            <a:spAutoFit/>
+          </a:bodyPr>
+          <a:lstStyle/>
+          <a:p>
+            <a:r>
+              <a:rPr lang="en-US" altLang="en-US" dirty="0">
+                <a:latin typeface="Arial" panose="020B0604020202020204" pitchFamily="34" charset="0"/>
+              </a:rPr>
+              <a:t>  </a:t>
+            </a:r>
+            <a:endParaRPr kumimoji="0" lang="en-US" altLang="en-US" b="0" i="0" u="none" strike="noStrike" cap="none" normalizeH="0" baseline="0" dirty="0">
+              <a:ln>
+                <a:noFill/>
+              </a:ln>
+              <a:solidFill>
+                <a:schemeClr val="tx1"/>
+              </a:solidFill>
+              <a:effectLst/>
+              <a:latin typeface="Arial" panose="020B0604020202020204" pitchFamily="34" charset="0"/>
+            </a:endParaRPr>
+          </a:p>
+        </p:txBody>
+      </p:sp>
+      <p:pic>
+        <p:nvPicPr>
+          <p:cNvPr id="1026" name="Picture 2" descr="https://ssl.gstatic.com/ui/v1/icons/mail/images/cleardot.gif"/>
+          <p:cNvPicPr>
+            <a:picLocks noChangeAspect="1" noChangeArrowheads="1"/>
+          </p:cNvPicPr>
+          <p:nvPr/>
+        </p:nvPicPr>
+        <p:blipFill>
+          <a:blip r:embed="rId3">
+            <a:extLst>
+              <a:ext uri="{28A0092B-C50C-407E-A947-70E740481C1C}">
+                <a14:useLocalDpi xmlns:a14="http://schemas.microsoft.com/office/drawing/2010/main" val="0"/>
+              </a:ext>
+            </a:extLst>
+          </a:blip>
+          <a:srcRect/>
+          <a:stretch>
+            <a:fillRect/>
+          </a:stretch>
+        </p:blipFill>
+        <p:spPr bwMode="auto">
+          <a:xfrm>
+            <a:off x="1587501" y="1"/>
+            <a:ext cx="9525" cy="9525"/>
+          </a:xfrm>
+          <a:prstGeom prst="rect">
+            <a:avLst/>
+          </a:prstGeom>
+          <a:noFill/>
+          <a:extLst>
+            <a:ext uri="{909E8E84-426E-40DD-AFC4-6F175D3DCCD1}">
+              <a14:hiddenFill xmlns:a14="http://schemas.microsoft.com/office/drawing/2010/main">
+                <a:solidFill>
+                  <a:srgbClr val="FFFFFF"/>
+                </a:solidFill>
+              </a14:hiddenFill>
+            </a:ext>
+          </a:extLst>
+        </p:spPr>
+      </p:pic>
+    </p:spTree>
+    <p:extLst>
+      <p:ext uri="{BB962C8B-B14F-4D97-AF65-F5344CB8AC3E}">
+        <p14:creationId xmlns:p14="http://schemas.microsoft.com/office/powerpoint/2010/main" val="770212400"/>
+      </p:ext>
+    </p:extLst>
+  </p:cSld>
+  <p:clrMapOvr>
+    <a:masterClrMapping/>
+  </p:clrMapOvr>
+</p:sld>
+</file>
+
+<file path=ppt/slides/slide2.xml><?xml version="1.0" encoding="utf-8"?>
+<p:sld xmlns:a="http://schemas.openxmlformats.org/drawingml/2006/main" xmlns:r="http://schemas.openxmlformats.org/officeDocument/2006/relationships" xmlns:p="http://schemas.openxmlformats.org/presentationml/2006/main">
+  <p:cSld>
+    <p:spTree>
+      <p:nvGrpSpPr>
+        <p:cNvPr id="1" name=""/>
+        <p:cNvGrpSpPr/>
+        <p:nvPr/>
+      </p:nvGrpSpPr>
+      <p:grpSpPr>
+        <a:xfrm>
+          <a:off x="0" y="0"/>
+          <a:ext cx="0" cy="0"/>
+          <a:chOff x="0" y="0"/>
+          <a:chExt cx="0" cy="0"/>
+        </a:xfrm>
+      </p:grpSpPr>
+      <p:sp>
+        <p:nvSpPr>
+          <p:cNvPr id="5" name="Title 4">
+            <a:extLst>
+              <a:ext uri="{FF2B5EF4-FFF2-40B4-BE49-F238E27FC236}">
+                <a16:creationId xmlns:a16="http://schemas.microsoft.com/office/drawing/2014/main" id="{87239D59-EB78-BB54-DD6B-80D4AC743BD1}"/>
+              </a:ext>
+            </a:extLst>
+          </p:cNvPr>
+          <p:cNvSpPr>
+            <a:spLocks noGrp="1"/>
+          </p:cNvSpPr>
+          <p:nvPr>
+            <p:ph type="title"/>
+          </p:nvPr>
+        </p:nvSpPr>
+        <p:spPr>
+          <a:xfrm>
+            <a:off x="550718" y="132924"/>
+            <a:ext cx="10972800" cy="777307"/>
+          </a:xfrm>
+        </p:spPr>
+        <p:txBody>
+          <a:bodyPr/>
+          <a:lstStyle/>
+          <a:p>
+            <a:pPr algn="l"/>
+            <a:r>
+              <a:rPr lang="en-US" sz="4000" dirty="0"/>
+              <a:t>Thank you for sponsoring my visit and this workshop</a:t>
+            </a:r>
+          </a:p>
+        </p:txBody>
+      </p:sp>
+      <p:sp>
+        <p:nvSpPr>
+          <p:cNvPr id="4" name="Slide Number Placeholder 3">
+            <a:extLst>
+              <a:ext uri="{FF2B5EF4-FFF2-40B4-BE49-F238E27FC236}">
+                <a16:creationId xmlns:a16="http://schemas.microsoft.com/office/drawing/2014/main" id="{7A912EE3-69C8-D38B-5C25-B70D3EBE4E42}"/>
+              </a:ext>
+            </a:extLst>
+          </p:cNvPr>
+          <p:cNvSpPr>
+            <a:spLocks noGrp="1"/>
+          </p:cNvSpPr>
+          <p:nvPr>
+            <p:ph type="sldNum" sz="quarter" idx="12"/>
+          </p:nvPr>
+        </p:nvSpPr>
+        <p:spPr>
+          <a:xfrm>
+            <a:off x="8890000" y="6378040"/>
+            <a:ext cx="2844800" cy="365125"/>
+          </a:xfrm>
+        </p:spPr>
+        <p:txBody>
+          <a:bodyPr/>
+          <a:lstStyle/>
+          <a:p>
+            <a:pPr>
+              <a:defRPr/>
+            </a:pPr>
+            <a:fld id="{FFFB4C55-9A55-45A0-A2A5-ECC3126D7CB8}" type="slidenum">
+              <a:rPr lang="en-US" smtClean="0"/>
+              <a:pPr>
+                <a:defRPr/>
+              </a:pPr>
+              <a:t>2</a:t>
+            </a:fld>
+            <a:endParaRPr lang="en-US"/>
+          </a:p>
+        </p:txBody>
+      </p:sp>
+      <p:pic>
+        <p:nvPicPr>
+          <p:cNvPr id="6" name="Picture 5">
+            <a:extLst>
+              <a:ext uri="{FF2B5EF4-FFF2-40B4-BE49-F238E27FC236}">
+                <a16:creationId xmlns:a16="http://schemas.microsoft.com/office/drawing/2014/main" id="{3B69A0FD-C4DE-0692-979F-E07ECA403756}"/>
+              </a:ext>
+            </a:extLst>
+          </p:cNvPr>
+          <p:cNvPicPr>
+            <a:picLocks noChangeAspect="1"/>
+          </p:cNvPicPr>
+          <p:nvPr/>
+        </p:nvPicPr>
+        <p:blipFill rotWithShape="1">
+          <a:blip r:embed="rId3"/>
+          <a:srcRect t="14943"/>
+          <a:stretch/>
+        </p:blipFill>
+        <p:spPr>
+          <a:xfrm>
+            <a:off x="914400" y="4114800"/>
+            <a:ext cx="4575374" cy="784305"/>
+          </a:xfrm>
+          <a:prstGeom prst="rect">
+            <a:avLst/>
+          </a:prstGeom>
+        </p:spPr>
+      </p:pic>
+      <p:pic>
+        <p:nvPicPr>
+          <p:cNvPr id="7" name="Picture 6">
+            <a:extLst>
+              <a:ext uri="{FF2B5EF4-FFF2-40B4-BE49-F238E27FC236}">
+                <a16:creationId xmlns:a16="http://schemas.microsoft.com/office/drawing/2014/main" id="{EF5D82E4-E4CE-B06E-59A3-7E8DE61C4A87}"/>
+              </a:ext>
+            </a:extLst>
+          </p:cNvPr>
+          <p:cNvPicPr>
+            <a:picLocks noChangeAspect="1"/>
+          </p:cNvPicPr>
+          <p:nvPr/>
+        </p:nvPicPr>
+        <p:blipFill rotWithShape="1">
+          <a:blip r:embed="rId4"/>
+          <a:srcRect t="17762"/>
+          <a:stretch/>
+        </p:blipFill>
+        <p:spPr>
+          <a:xfrm>
+            <a:off x="1066800" y="956293"/>
+            <a:ext cx="2932764" cy="546764"/>
+          </a:xfrm>
+          <a:prstGeom prst="rect">
+            <a:avLst/>
+          </a:prstGeom>
+        </p:spPr>
+      </p:pic>
+      <p:sp>
+        <p:nvSpPr>
+          <p:cNvPr id="8" name="TextBox 7">
+            <a:extLst>
+              <a:ext uri="{FF2B5EF4-FFF2-40B4-BE49-F238E27FC236}">
+                <a16:creationId xmlns:a16="http://schemas.microsoft.com/office/drawing/2014/main" id="{24CDF218-ED5D-7C82-FB58-E0A1823AECBB}"/>
+              </a:ext>
+            </a:extLst>
+          </p:cNvPr>
+          <p:cNvSpPr txBox="1"/>
+          <p:nvPr/>
+        </p:nvSpPr>
+        <p:spPr>
+          <a:xfrm rot="10800000" flipV="1">
+            <a:off x="990600" y="4953000"/>
+            <a:ext cx="10093036" cy="1000274"/>
+          </a:xfrm>
+          <a:prstGeom prst="rect">
+            <a:avLst/>
+          </a:prstGeom>
+          <a:noFill/>
+        </p:spPr>
+        <p:txBody>
+          <a:bodyPr wrap="square" rtlCol="0">
+            <a:spAutoFit/>
+          </a:bodyPr>
+          <a:lstStyle/>
+          <a:p>
+            <a:pPr algn="l" rtl="0">
+              <a:spcAft>
+                <a:spcPts val="300"/>
+              </a:spcAft>
+            </a:pPr>
+            <a:r>
+              <a:rPr lang="en-US" b="1" i="0" dirty="0">
+                <a:solidFill>
+                  <a:srgbClr val="222222"/>
+                </a:solidFill>
+                <a:effectLst/>
+                <a:latin typeface="Arial" panose="020B0604020202020204" pitchFamily="34" charset="0"/>
+              </a:rPr>
+              <a:t>Dean Chun-Yen Lin </a:t>
+            </a:r>
+            <a:r>
+              <a:rPr lang="zh-HK" altLang="en-US" b="0" i="0" dirty="0">
+                <a:solidFill>
+                  <a:srgbClr val="222222"/>
+                </a:solidFill>
+                <a:effectLst/>
+                <a:latin typeface="Arial" panose="020B0604020202020204" pitchFamily="34" charset="0"/>
+              </a:rPr>
+              <a:t>林俊彥</a:t>
+            </a:r>
+            <a:r>
+              <a:rPr lang="zh-CN" altLang="en-US" b="0" i="0" dirty="0">
+                <a:solidFill>
+                  <a:srgbClr val="222222"/>
+                </a:solidFill>
+                <a:effectLst/>
+                <a:latin typeface="Arial" panose="020B0604020202020204" pitchFamily="34" charset="0"/>
+              </a:rPr>
+              <a:t>教授</a:t>
+            </a:r>
+            <a:r>
+              <a:rPr lang="en-US" altLang="zh-CN" b="0" i="0" dirty="0">
+                <a:solidFill>
+                  <a:srgbClr val="222222"/>
+                </a:solidFill>
+                <a:effectLst/>
+                <a:latin typeface="Arial" panose="020B0604020202020204" pitchFamily="34" charset="0"/>
+              </a:rPr>
+              <a:t>, Dean of College of Medicine, CGU</a:t>
+            </a:r>
+            <a:endParaRPr lang="en-US" b="1" i="0" dirty="0">
+              <a:solidFill>
+                <a:srgbClr val="222222"/>
+              </a:solidFill>
+              <a:effectLst/>
+              <a:latin typeface="Arial" panose="020B0604020202020204" pitchFamily="34" charset="0"/>
+            </a:endParaRPr>
+          </a:p>
+          <a:p>
+            <a:pPr algn="l" rtl="0">
+              <a:spcAft>
+                <a:spcPts val="300"/>
+              </a:spcAft>
+            </a:pPr>
+            <a:r>
+              <a:rPr lang="en-US" b="1" i="0" dirty="0">
+                <a:solidFill>
+                  <a:srgbClr val="222222"/>
+                </a:solidFill>
+                <a:effectLst/>
+                <a:latin typeface="Arial" panose="020B0604020202020204" pitchFamily="34" charset="0"/>
+              </a:rPr>
+              <a:t>Professor Ming-Ling Kuo </a:t>
+            </a:r>
+            <a:r>
+              <a:rPr lang="zh-CN" altLang="en-US" b="0" i="0" dirty="0">
+                <a:solidFill>
+                  <a:srgbClr val="222222"/>
+                </a:solidFill>
+                <a:effectLst/>
+                <a:latin typeface="PMingLiU" panose="02020500000000000000" pitchFamily="18" charset="-120"/>
+                <a:ea typeface="PMingLiU" panose="02020500000000000000" pitchFamily="18" charset="-120"/>
+              </a:rPr>
+              <a:t>郭敏玲</a:t>
+            </a:r>
+            <a:r>
+              <a:rPr lang="zh-CN" altLang="en-US" dirty="0">
+                <a:solidFill>
+                  <a:srgbClr val="222222"/>
+                </a:solidFill>
+                <a:latin typeface="PMingLiU" panose="02020500000000000000" pitchFamily="18" charset="-120"/>
+                <a:ea typeface="PMingLiU" panose="02020500000000000000" pitchFamily="18" charset="-120"/>
+              </a:rPr>
+              <a:t>教授</a:t>
+            </a:r>
+            <a:r>
+              <a:rPr lang="en-US" altLang="zh-CN" dirty="0">
+                <a:solidFill>
+                  <a:srgbClr val="222222"/>
+                </a:solidFill>
+                <a:latin typeface="Arial" panose="020B0604020202020204" pitchFamily="34" charset="0"/>
+              </a:rPr>
+              <a:t>, Director, Graduate Institute of Biomedical Sciences, CGU</a:t>
+            </a:r>
+          </a:p>
+          <a:p>
+            <a:pPr algn="l" rtl="0">
+              <a:spcAft>
+                <a:spcPts val="300"/>
+              </a:spcAft>
+            </a:pPr>
+            <a:r>
+              <a:rPr lang="en-US" altLang="zh-CN" b="1" i="0" dirty="0">
+                <a:solidFill>
+                  <a:srgbClr val="222222"/>
+                </a:solidFill>
+                <a:effectLst/>
+                <a:latin typeface="Arial" panose="020B0604020202020204" pitchFamily="34" charset="0"/>
+              </a:rPr>
+              <a:t>Dr Ian Y. </a:t>
+            </a:r>
+            <a:r>
+              <a:rPr lang="en-US" altLang="zh-CN" b="1" dirty="0">
+                <a:solidFill>
+                  <a:srgbClr val="222222"/>
+                </a:solidFill>
+                <a:latin typeface="Arial" panose="020B0604020202020204" pitchFamily="34" charset="0"/>
+              </a:rPr>
+              <a:t>F. </a:t>
+            </a:r>
+            <a:r>
+              <a:rPr lang="en-US" altLang="zh-CN" b="1" i="0" dirty="0">
+                <a:solidFill>
+                  <a:srgbClr val="222222"/>
+                </a:solidFill>
+                <a:effectLst/>
+                <a:latin typeface="Arial" panose="020B0604020202020204" pitchFamily="34" charset="0"/>
+              </a:rPr>
+              <a:t>Zhang</a:t>
+            </a:r>
+            <a:r>
+              <a:rPr lang="en-US" altLang="zh-CN" b="0" i="0" dirty="0">
+                <a:solidFill>
+                  <a:srgbClr val="222222"/>
+                </a:solidFill>
+                <a:effectLst/>
+                <a:latin typeface="Arial" panose="020B0604020202020204" pitchFamily="34" charset="0"/>
+              </a:rPr>
+              <a:t> </a:t>
+            </a:r>
+            <a:r>
+              <a:rPr lang="zh-HK" altLang="en-US" b="0" i="0" dirty="0">
+                <a:solidFill>
+                  <a:srgbClr val="222222"/>
+                </a:solidFill>
+                <a:effectLst/>
+                <a:latin typeface="Arial" panose="020B0604020202020204" pitchFamily="34" charset="0"/>
+              </a:rPr>
+              <a:t>張益峯</a:t>
+            </a:r>
+            <a:r>
+              <a:rPr lang="en-US" altLang="zh-HK" dirty="0">
+                <a:solidFill>
+                  <a:srgbClr val="222222"/>
+                </a:solidFill>
+                <a:latin typeface="Arial" panose="020B0604020202020204" pitchFamily="34" charset="0"/>
+              </a:rPr>
+              <a:t>, </a:t>
+            </a:r>
+            <a:r>
+              <a:rPr lang="en-US" altLang="zh-CN" b="0" i="0" dirty="0">
+                <a:solidFill>
+                  <a:srgbClr val="222222"/>
+                </a:solidFill>
+                <a:effectLst/>
+                <a:latin typeface="Arial" panose="020B0604020202020204" pitchFamily="34" charset="0"/>
+              </a:rPr>
+              <a:t>Molecular Medicine Research Center, CGU</a:t>
+            </a:r>
+          </a:p>
+        </p:txBody>
+      </p:sp>
+      <p:pic>
+        <p:nvPicPr>
+          <p:cNvPr id="12" name="Picture 11">
+            <a:extLst>
+              <a:ext uri="{FF2B5EF4-FFF2-40B4-BE49-F238E27FC236}">
+                <a16:creationId xmlns:a16="http://schemas.microsoft.com/office/drawing/2014/main" id="{8AA8B995-657A-2FF4-18C0-886BF28A2E61}"/>
+              </a:ext>
+            </a:extLst>
+          </p:cNvPr>
+          <p:cNvPicPr>
+            <a:picLocks noChangeAspect="1"/>
+          </p:cNvPicPr>
+          <p:nvPr/>
+        </p:nvPicPr>
+        <p:blipFill>
+          <a:blip r:embed="rId5"/>
+          <a:stretch>
+            <a:fillRect/>
+          </a:stretch>
+        </p:blipFill>
+        <p:spPr>
+          <a:xfrm>
+            <a:off x="1066800" y="3124200"/>
+            <a:ext cx="4069475" cy="859348"/>
+          </a:xfrm>
+          <a:prstGeom prst="rect">
+            <a:avLst/>
+          </a:prstGeom>
+        </p:spPr>
+      </p:pic>
+      <p:pic>
+        <p:nvPicPr>
+          <p:cNvPr id="11" name="Picture 10">
+            <a:extLst>
+              <a:ext uri="{FF2B5EF4-FFF2-40B4-BE49-F238E27FC236}">
+                <a16:creationId xmlns:a16="http://schemas.microsoft.com/office/drawing/2014/main" id="{C835B5DE-DA0B-53B1-54E4-AB6B8C53EFF6}"/>
+              </a:ext>
+            </a:extLst>
+          </p:cNvPr>
+          <p:cNvPicPr>
+            <a:picLocks noChangeAspect="1"/>
+          </p:cNvPicPr>
+          <p:nvPr/>
+        </p:nvPicPr>
+        <p:blipFill rotWithShape="1">
+          <a:blip r:embed="rId6"/>
+          <a:srcRect l="1552"/>
+          <a:stretch/>
+        </p:blipFill>
+        <p:spPr>
+          <a:xfrm>
+            <a:off x="990600" y="2286000"/>
+            <a:ext cx="4834670" cy="730334"/>
+          </a:xfrm>
+          <a:prstGeom prst="rect">
+            <a:avLst/>
+          </a:prstGeom>
+        </p:spPr>
+      </p:pic>
+      <p:grpSp>
+        <p:nvGrpSpPr>
+          <p:cNvPr id="13" name="Group 12">
+            <a:extLst>
+              <a:ext uri="{FF2B5EF4-FFF2-40B4-BE49-F238E27FC236}">
+                <a16:creationId xmlns:a16="http://schemas.microsoft.com/office/drawing/2014/main" id="{520511C8-3FEE-0B45-FF0B-BD9F54AE854F}"/>
+              </a:ext>
+            </a:extLst>
+          </p:cNvPr>
+          <p:cNvGrpSpPr/>
+          <p:nvPr/>
+        </p:nvGrpSpPr>
+        <p:grpSpPr>
+          <a:xfrm>
+            <a:off x="1066800" y="1647113"/>
+            <a:ext cx="7885593" cy="546764"/>
+            <a:chOff x="1258408" y="1647113"/>
+            <a:chExt cx="7885593" cy="546764"/>
+          </a:xfrm>
+        </p:grpSpPr>
+        <p:sp>
+          <p:nvSpPr>
+            <p:cNvPr id="2" name="TextBox 1">
+              <a:extLst>
+                <a:ext uri="{FF2B5EF4-FFF2-40B4-BE49-F238E27FC236}">
+                  <a16:creationId xmlns:a16="http://schemas.microsoft.com/office/drawing/2014/main" id="{93AEE005-EC25-38E5-BA56-CAED029B8FBE}"/>
+                </a:ext>
+              </a:extLst>
+            </p:cNvPr>
+            <p:cNvSpPr txBox="1"/>
+            <p:nvPr/>
+          </p:nvSpPr>
+          <p:spPr>
+            <a:xfrm>
+              <a:off x="3962401" y="1671935"/>
+              <a:ext cx="5181600" cy="461665"/>
+            </a:xfrm>
+            <a:prstGeom prst="rect">
+              <a:avLst/>
+            </a:prstGeom>
+            <a:noFill/>
+          </p:spPr>
+          <p:txBody>
+            <a:bodyPr wrap="square" rtlCol="0">
+              <a:spAutoFit/>
+            </a:bodyPr>
+            <a:lstStyle/>
+            <a:p>
+              <a:r>
+                <a:rPr lang="en-US" sz="2400" b="1" dirty="0">
+                  <a:latin typeface="Avenir Next LT Pro" panose="020B0504020202020204" pitchFamily="34" charset="0"/>
+                </a:rPr>
+                <a:t>| </a:t>
+              </a:r>
+              <a:r>
+                <a:rPr lang="en-US" sz="2000" dirty="0">
+                  <a:latin typeface="Avenir Next LT Pro" panose="020B0504020202020204" pitchFamily="34" charset="0"/>
+                </a:rPr>
+                <a:t>Graduate Institute of Biomedical Sciences</a:t>
+              </a:r>
+            </a:p>
+          </p:txBody>
+        </p:sp>
+        <p:pic>
+          <p:nvPicPr>
+            <p:cNvPr id="9" name="Picture 8">
+              <a:extLst>
+                <a:ext uri="{FF2B5EF4-FFF2-40B4-BE49-F238E27FC236}">
+                  <a16:creationId xmlns:a16="http://schemas.microsoft.com/office/drawing/2014/main" id="{FD80AE22-C2A2-5793-8131-AC8CBADE1D8C}"/>
+                </a:ext>
+              </a:extLst>
+            </p:cNvPr>
+            <p:cNvPicPr>
+              <a:picLocks noChangeAspect="1"/>
+            </p:cNvPicPr>
+            <p:nvPr/>
+          </p:nvPicPr>
+          <p:blipFill rotWithShape="1">
+            <a:blip r:embed="rId4"/>
+            <a:srcRect t="17762" r="7800"/>
+            <a:stretch/>
+          </p:blipFill>
+          <p:spPr>
+            <a:xfrm>
+              <a:off x="1258408" y="1647113"/>
+              <a:ext cx="2703993" cy="546764"/>
+            </a:xfrm>
+            <a:prstGeom prst="rect">
+              <a:avLst/>
+            </a:prstGeom>
+          </p:spPr>
+        </p:pic>
+      </p:grpSp>
+    </p:spTree>
+    <p:extLst>
+      <p:ext uri="{BB962C8B-B14F-4D97-AF65-F5344CB8AC3E}">
+        <p14:creationId xmlns:p14="http://schemas.microsoft.com/office/powerpoint/2010/main" val="3536203557"/>
+      </p:ext>
+    </p:extLst>
+  </p:cSld>
+  <p:clrMapOvr>
+    <a:masterClrMapping/>
+  </p:clrMapOvr>
+</p:sld>
+</file>
+
+<file path=ppt/slides/slide3.xml><?xml version="1.0" encoding="utf-8"?>
+<p:sld xmlns:a="http://schemas.openxmlformats.org/drawingml/2006/main" xmlns:r="http://schemas.openxmlformats.org/officeDocument/2006/relationships" xmlns:p="http://schemas.openxmlformats.org/presentationml/2006/main">
+  <p:cSld>
+    <p:spTree>
+      <p:nvGrpSpPr>
+        <p:cNvPr id="1" name=""/>
+        <p:cNvGrpSpPr/>
+        <p:nvPr/>
+      </p:nvGrpSpPr>
+      <p:grpSpPr>
+        <a:xfrm>
+          <a:off x="0" y="0"/>
+          <a:ext cx="0" cy="0"/>
+          <a:chOff x="0" y="0"/>
+          <a:chExt cx="0" cy="0"/>
+        </a:xfrm>
+      </p:grpSpPr>
+      <p:sp>
+        <p:nvSpPr>
           <p:cNvPr id="2" name="Title 1">
             <a:extLst>
               <a:ext uri="{FF2B5EF4-FFF2-40B4-BE49-F238E27FC236}">
@@ -2991,7 +4346,7 @@
         </p:nvSpPr>
         <p:spPr>
           <a:xfrm>
-            <a:off x="628650" y="365126"/>
+            <a:off x="2152650" y="365126"/>
             <a:ext cx="7886700" cy="1920874"/>
           </a:xfrm>
         </p:spPr>
@@ -3040,12 +4395,14 @@
         </p:nvSpPr>
         <p:spPr>
           <a:xfrm>
-            <a:off x="628650" y="2626467"/>
+            <a:off x="2152650" y="2626468"/>
             <a:ext cx="7886700" cy="3550495"/>
           </a:xfrm>
         </p:spPr>
         <p:txBody>
-          <a:bodyPr/>
+          <a:bodyPr>
+            <a:normAutofit/>
+          </a:bodyPr>
           <a:lstStyle/>
           <a:p>
             <a:r>
@@ -3079,6 +4436,29 @@
             <a:r>
               <a:rPr lang="en-US" dirty="0"/>
               <a:t>123qwe</a:t>
+            </a:r>
+          </a:p>
+          <a:p>
+            <a:r>
+              <a:rPr lang="en-US" dirty="0" err="1"/>
+              <a:t>github</a:t>
+            </a:r>
+            <a:r>
+              <a:rPr lang="en-US" dirty="0"/>
+              <a:t> repo for workshop:</a:t>
+            </a:r>
+          </a:p>
+          <a:p>
+            <a:pPr marL="0" indent="0">
+              <a:buNone/>
+            </a:pPr>
+            <a:r>
+              <a:rPr lang="en-US" dirty="0"/>
+              <a:t> </a:t>
+            </a:r>
+            <a:r>
+              <a:rPr lang="en-US" sz="2400" dirty="0"/>
+              <a:t>https://github.com/Rozen-Lab/Taiwan_RNAseq_Workshop</a:t>
             </a:r>
           </a:p>
           <a:p>
@@ -3102,7 +4482,7 @@
 </p:sld>
 </file>
 
-<file path=ppt/slides/slide2.xml><?xml version="1.0" encoding="utf-8"?>
+<file path=ppt/slides/slide4.xml><?xml version="1.0" encoding="utf-8"?>
 <p:sld xmlns:a="http://schemas.openxmlformats.org/drawingml/2006/main" xmlns:r="http://schemas.openxmlformats.org/officeDocument/2006/relationships" xmlns:p="http://schemas.openxmlformats.org/presentationml/2006/main">
   <p:cSld>
     <p:spTree>
@@ -3148,7 +4528,7 @@
         </p:blipFill>
         <p:spPr bwMode="auto">
           <a:xfrm>
-            <a:off x="1342815" y="1077758"/>
+            <a:off x="2866815" y="1077759"/>
             <a:ext cx="6779380" cy="5138057"/>
           </a:xfrm>
           <a:prstGeom prst="rect">
@@ -3180,7 +4560,7 @@
         </p:nvSpPr>
         <p:spPr>
           <a:xfrm>
-            <a:off x="1342815" y="6215815"/>
+            <a:off x="2866816" y="6215815"/>
             <a:ext cx="7072009" cy="369332"/>
           </a:xfrm>
           <a:prstGeom prst="rect">
@@ -3219,7 +4599,7 @@
         </p:nvSpPr>
         <p:spPr>
           <a:xfrm>
-            <a:off x="628650" y="170597"/>
+            <a:off x="2152650" y="170597"/>
             <a:ext cx="7886700" cy="627072"/>
           </a:xfrm>
         </p:spPr>
@@ -3249,7 +4629,7 @@
 </p:sld>
 </file>
 
-<file path=ppt/slides/slide3.xml><?xml version="1.0" encoding="utf-8"?>
+<file path=ppt/slides/slide5.xml><?xml version="1.0" encoding="utf-8"?>
 <p:sld xmlns:a="http://schemas.openxmlformats.org/drawingml/2006/main" xmlns:r="http://schemas.openxmlformats.org/officeDocument/2006/relationships" xmlns:p="http://schemas.openxmlformats.org/presentationml/2006/main">
   <p:cSld>
     <p:spTree>
@@ -3284,7 +4664,7 @@
         </p:nvSpPr>
         <p:spPr>
           <a:xfrm>
-            <a:off x="628650" y="365127"/>
+            <a:off x="2152650" y="365127"/>
             <a:ext cx="7886700" cy="1055112"/>
           </a:xfrm>
         </p:spPr>
@@ -3321,7 +4701,7 @@
         </p:blipFill>
         <p:spPr>
           <a:xfrm>
-            <a:off x="1229346" y="2282729"/>
+            <a:off x="2753346" y="2282729"/>
             <a:ext cx="5303980" cy="1729890"/>
           </a:xfrm>
           <a:prstGeom prst="rect">
@@ -3343,7 +4723,7 @@
         </p:nvSpPr>
         <p:spPr>
           <a:xfrm>
-            <a:off x="1040590" y="1631296"/>
+            <a:off x="2564590" y="1631297"/>
             <a:ext cx="5681492" cy="646331"/>
           </a:xfrm>
           <a:prstGeom prst="rect">
@@ -3400,7 +4780,7 @@
         </p:nvSpPr>
         <p:spPr>
           <a:xfrm>
-            <a:off x="973283" y="4223676"/>
+            <a:off x="2497284" y="4223676"/>
             <a:ext cx="7372531" cy="369332"/>
           </a:xfrm>
           <a:prstGeom prst="rect">
@@ -3435,7 +4815,7 @@
         </p:nvSpPr>
         <p:spPr>
           <a:xfrm>
-            <a:off x="894675" y="4826675"/>
+            <a:off x="2418675" y="4826676"/>
             <a:ext cx="7189010" cy="2031325"/>
           </a:xfrm>
           <a:prstGeom prst="rect">
@@ -3497,6 +4877,92 @@
     <p:extLst>
       <p:ext uri="{BB962C8B-B14F-4D97-AF65-F5344CB8AC3E}">
         <p14:creationId xmlns:p14="http://schemas.microsoft.com/office/powerpoint/2010/main" val="1321261995"/>
+      </p:ext>
+    </p:extLst>
+  </p:cSld>
+  <p:clrMapOvr>
+    <a:masterClrMapping/>
+  </p:clrMapOvr>
+</p:sld>
+</file>
+
+<file path=ppt/slides/slide6.xml><?xml version="1.0" encoding="utf-8"?>
+<p:sld xmlns:a="http://schemas.openxmlformats.org/drawingml/2006/main" xmlns:r="http://schemas.openxmlformats.org/officeDocument/2006/relationships" xmlns:p="http://schemas.openxmlformats.org/presentationml/2006/main">
+  <p:cSld>
+    <p:spTree>
+      <p:nvGrpSpPr>
+        <p:cNvPr id="1" name=""/>
+        <p:cNvGrpSpPr/>
+        <p:nvPr/>
+      </p:nvGrpSpPr>
+      <p:grpSpPr>
+        <a:xfrm>
+          <a:off x="0" y="0"/>
+          <a:ext cx="0" cy="0"/>
+          <a:chOff x="0" y="0"/>
+          <a:chExt cx="0" cy="0"/>
+        </a:xfrm>
+      </p:grpSpPr>
+      <p:sp>
+        <p:nvSpPr>
+          <p:cNvPr id="2" name="Title 1">
+            <a:extLst>
+              <a:ext uri="{FF2B5EF4-FFF2-40B4-BE49-F238E27FC236}">
+                <a16:creationId xmlns:a16="http://schemas.microsoft.com/office/drawing/2014/main" id="{3C331C4A-DAA0-195F-12A8-5B779DED1895}"/>
+              </a:ext>
+            </a:extLst>
+          </p:cNvPr>
+          <p:cNvSpPr>
+            <a:spLocks noGrp="1"/>
+          </p:cNvSpPr>
+          <p:nvPr>
+            <p:ph type="title"/>
+          </p:nvPr>
+        </p:nvSpPr>
+        <p:spPr/>
+        <p:txBody>
+          <a:bodyPr/>
+          <a:lstStyle/>
+          <a:p>
+            <a:r>
+              <a:rPr lang="en-US" dirty="0"/>
+              <a:t>Resources</a:t>
+            </a:r>
+          </a:p>
+        </p:txBody>
+      </p:sp>
+      <p:sp>
+        <p:nvSpPr>
+          <p:cNvPr id="3" name="Content Placeholder 2">
+            <a:extLst>
+              <a:ext uri="{FF2B5EF4-FFF2-40B4-BE49-F238E27FC236}">
+                <a16:creationId xmlns:a16="http://schemas.microsoft.com/office/drawing/2014/main" id="{EA5648A5-1D0A-9206-8663-52C98FC058D6}"/>
+              </a:ext>
+            </a:extLst>
+          </p:cNvPr>
+          <p:cNvSpPr>
+            <a:spLocks noGrp="1"/>
+          </p:cNvSpPr>
+          <p:nvPr>
+            <p:ph idx="1"/>
+          </p:nvPr>
+        </p:nvSpPr>
+        <p:spPr/>
+        <p:txBody>
+          <a:bodyPr/>
+          <a:lstStyle/>
+          <a:p>
+            <a:r>
+              <a:rPr lang="en-US" dirty="0"/>
+              <a:t>Seurat tutorials: https://satijalab.org/seurat/articles/get_started</a:t>
+            </a:r>
+          </a:p>
+        </p:txBody>
+      </p:sp>
+    </p:spTree>
+    <p:extLst>
+      <p:ext uri="{BB962C8B-B14F-4D97-AF65-F5344CB8AC3E}">
+        <p14:creationId xmlns:p14="http://schemas.microsoft.com/office/powerpoint/2010/main" val="3527429649"/>
       </p:ext>
     </p:extLst>
   </p:cSld>
@@ -3765,4 +5231,299 @@
     </a:ext>
   </a:extLst>
 </a:theme>
+</file>
+
+<file path=ppt/theme/theme2.xml><?xml version="1.0" encoding="utf-8"?>
+<a:theme xmlns:a="http://schemas.openxmlformats.org/drawingml/2006/main" name="Office Theme">
+  <a:themeElements>
+    <a:clrScheme name="Office">
+      <a:dk1>
+        <a:sysClr val="windowText" lastClr="000000"/>
+      </a:dk1>
+      <a:lt1>
+        <a:sysClr val="window" lastClr="FFFFFF"/>
+      </a:lt1>
+      <a:dk2>
+        <a:srgbClr val="44546A"/>
+      </a:dk2>
+      <a:lt2>
+        <a:srgbClr val="E7E6E6"/>
+      </a:lt2>
+      <a:accent1>
+        <a:srgbClr val="4472C4"/>
+      </a:accent1>
+      <a:accent2>
+        <a:srgbClr val="ED7D31"/>
+      </a:accent2>
+      <a:accent3>
+        <a:srgbClr val="A5A5A5"/>
+      </a:accent3>
+      <a:accent4>
+        <a:srgbClr val="FFC000"/>
+      </a:accent4>
+      <a:accent5>
+        <a:srgbClr val="5B9BD5"/>
+      </a:accent5>
+      <a:accent6>
+        <a:srgbClr val="70AD47"/>
+      </a:accent6>
+      <a:hlink>
+        <a:srgbClr val="0563C1"/>
+      </a:hlink>
+      <a:folHlink>
+        <a:srgbClr val="954F72"/>
+      </a:folHlink>
+    </a:clrScheme>
+    <a:fontScheme name="Office">
+      <a:majorFont>
+        <a:latin typeface="Calibri Light" panose="020F0302020204030204"/>
+        <a:ea typeface=""/>
+        <a:cs typeface=""/>
+        <a:font script="Jpan" typeface="游ゴシック Light"/>
+        <a:font script="Hang" typeface="맑은 고딕"/>
+        <a:font script="Hans" typeface="等线 Light"/>
+        <a:font script="Hant" typeface="新細明體"/>
+        <a:font script="Arab" typeface="Times New Roman"/>
+        <a:font script="Hebr" typeface="Times New Roman"/>
+        <a:font script="Thai" typeface="Angsana New"/>
+        <a:font script="Ethi" typeface="Nyala"/>
+        <a:font script="Beng" typeface="Vrinda"/>
+        <a:font script="Gujr" typeface="Shruti"/>
+        <a:font script="Khmr" typeface="MoolBoran"/>
+        <a:font script="Knda" typeface="Tunga"/>
+        <a:font script="Guru" typeface="Raavi"/>
+        <a:font script="Cans" typeface="Euphemia"/>
+        <a:font script="Cher" typeface="Plantagenet Cherokee"/>
+        <a:font script="Yiii" typeface="Microsoft Yi Baiti"/>
+        <a:font script="Tibt" typeface="Microsoft Himalaya"/>
+        <a:font script="Thaa" typeface="MV Boli"/>
+        <a:font script="Deva" typeface="Mangal"/>
+        <a:font script="Telu" typeface="Gautami"/>
+        <a:font script="Taml" typeface="Latha"/>
+        <a:font script="Syrc" typeface="Estrangelo Edessa"/>
+        <a:font script="Orya" typeface="Kalinga"/>
+        <a:font script="Mlym" typeface="Kartika"/>
+        <a:font script="Laoo" typeface="DokChampa"/>
+        <a:font script="Sinh" typeface="Iskoola Pota"/>
+        <a:font script="Mong" typeface="Mongolian Baiti"/>
+        <a:font script="Viet" typeface="Times New Roman"/>
+        <a:font script="Uigh" typeface="Microsoft Uighur"/>
+        <a:font script="Geor" typeface="Sylfaen"/>
+        <a:font script="Armn" typeface="Arial"/>
+        <a:font script="Bugi" typeface="Leelawadee UI"/>
+        <a:font script="Bopo" typeface="Microsoft JhengHei"/>
+        <a:font script="Java" typeface="Javanese Text"/>
+        <a:font script="Lisu" typeface="Segoe UI"/>
+        <a:font script="Mymr" typeface="Myanmar Text"/>
+        <a:font script="Nkoo" typeface="Ebrima"/>
+        <a:font script="Olck" typeface="Nirmala UI"/>
+        <a:font script="Osma" typeface="Ebrima"/>
+        <a:font script="Phag" typeface="Phagspa"/>
+        <a:font script="Syrn" typeface="Estrangelo Edessa"/>
+        <a:font script="Syrj" typeface="Estrangelo Edessa"/>
+        <a:font script="Syre" typeface="Estrangelo Edessa"/>
+        <a:font script="Sora" typeface="Nirmala UI"/>
+        <a:font script="Tale" typeface="Microsoft Tai Le"/>
+        <a:font script="Talu" typeface="Microsoft New Tai Lue"/>
+        <a:font script="Tfng" typeface="Ebrima"/>
+      </a:majorFont>
+      <a:minorFont>
+        <a:latin typeface="Calibri" panose="020F0502020204030204"/>
+        <a:ea typeface=""/>
+        <a:cs typeface=""/>
+        <a:font script="Jpan" typeface="游ゴシック"/>
+        <a:font script="Hang" typeface="맑은 고딕"/>
+        <a:font script="Hans" typeface="等线"/>
+        <a:font script="Hant" typeface="新細明體"/>
+        <a:font script="Arab" typeface="Arial"/>
+        <a:font script="Hebr" typeface="Arial"/>
+        <a:font script="Thai" typeface="Cordia New"/>
+        <a:font script="Ethi" typeface="Nyala"/>
+        <a:font script="Beng" typeface="Vrinda"/>
+        <a:font script="Gujr" typeface="Shruti"/>
+        <a:font script="Khmr" typeface="DaunPenh"/>
+        <a:font script="Knda" typeface="Tunga"/>
+        <a:font script="Guru" typeface="Raavi"/>
+        <a:font script="Cans" typeface="Euphemia"/>
+        <a:font script="Cher" typeface="Plantagenet Cherokee"/>
+        <a:font script="Yiii" typeface="Microsoft Yi Baiti"/>
+        <a:font script="Tibt" typeface="Microsoft Himalaya"/>
+        <a:font script="Thaa" typeface="MV Boli"/>
+        <a:font script="Deva" typeface="Mangal"/>
+        <a:font script="Telu" typeface="Gautami"/>
+        <a:font script="Taml" typeface="Latha"/>
+        <a:font script="Syrc" typeface="Estrangelo Edessa"/>
+        <a:font script="Orya" typeface="Kalinga"/>
+        <a:font script="Mlym" typeface="Kartika"/>
+        <a:font script="Laoo" typeface="DokChampa"/>
+        <a:font script="Sinh" typeface="Iskoola Pota"/>
+        <a:font script="Mong" typeface="Mongolian Baiti"/>
+        <a:font script="Viet" typeface="Arial"/>
+        <a:font script="Uigh" typeface="Microsoft Uighur"/>
+        <a:font script="Geor" typeface="Sylfaen"/>
+        <a:font script="Armn" typeface="Arial"/>
+        <a:font script="Bugi" typeface="Leelawadee UI"/>
+        <a:font script="Bopo" typeface="Microsoft JhengHei"/>
+        <a:font script="Java" typeface="Javanese Text"/>
+        <a:font script="Lisu" typeface="Segoe UI"/>
+        <a:font script="Mymr" typeface="Myanmar Text"/>
+        <a:font script="Nkoo" typeface="Ebrima"/>
+        <a:font script="Olck" typeface="Nirmala UI"/>
+        <a:font script="Osma" typeface="Ebrima"/>
+        <a:font script="Phag" typeface="Phagspa"/>
+        <a:font script="Syrn" typeface="Estrangelo Edessa"/>
+        <a:font script="Syrj" typeface="Estrangelo Edessa"/>
+        <a:font script="Syre" typeface="Estrangelo Edessa"/>
+        <a:font script="Sora" typeface="Nirmala UI"/>
+        <a:font script="Tale" typeface="Microsoft Tai Le"/>
+        <a:font script="Talu" typeface="Microsoft New Tai Lue"/>
+        <a:font script="Tfng" typeface="Ebrima"/>
+      </a:minorFont>
+    </a:fontScheme>
+    <a:fmtScheme name="Office">
+      <a:fillStyleLst>
+        <a:solidFill>
+          <a:schemeClr val="phClr"/>
+        </a:solidFill>
+        <a:gradFill rotWithShape="1">
+          <a:gsLst>
+            <a:gs pos="0">
+              <a:schemeClr val="phClr">
+                <a:lumMod val="110000"/>
+                <a:satMod val="105000"/>
+                <a:tint val="67000"/>
+              </a:schemeClr>
+            </a:gs>
+            <a:gs pos="50000">
+              <a:schemeClr val="phClr">
+                <a:lumMod val="105000"/>
+                <a:satMod val="103000"/>
+                <a:tint val="73000"/>
+              </a:schemeClr>
+            </a:gs>
+            <a:gs pos="100000">
+              <a:schemeClr val="phClr">
+                <a:lumMod val="105000"/>
+                <a:satMod val="109000"/>
+                <a:tint val="81000"/>
+              </a:schemeClr>
+            </a:gs>
+          </a:gsLst>
+          <a:lin ang="5400000" scaled="0"/>
+        </a:gradFill>
+        <a:gradFill rotWithShape="1">
+          <a:gsLst>
+            <a:gs pos="0">
+              <a:schemeClr val="phClr">
+                <a:satMod val="103000"/>
+                <a:lumMod val="102000"/>
+                <a:tint val="94000"/>
+              </a:schemeClr>
+            </a:gs>
+            <a:gs pos="50000">
+              <a:schemeClr val="phClr">
+                <a:satMod val="110000"/>
+                <a:lumMod val="100000"/>
+                <a:shade val="100000"/>
+              </a:schemeClr>
+            </a:gs>
+            <a:gs pos="100000">
+              <a:schemeClr val="phClr">
+                <a:lumMod val="99000"/>
+                <a:satMod val="120000"/>
+                <a:shade val="78000"/>
+              </a:schemeClr>
+            </a:gs>
+          </a:gsLst>
+          <a:lin ang="5400000" scaled="0"/>
+        </a:gradFill>
+      </a:fillStyleLst>
+      <a:lnStyleLst>
+        <a:ln w="6350" cap="flat" cmpd="sng" algn="ctr">
+          <a:solidFill>
+            <a:schemeClr val="phClr"/>
+          </a:solidFill>
+          <a:prstDash val="solid"/>
+          <a:miter lim="800000"/>
+        </a:ln>
+        <a:ln w="12700" cap="flat" cmpd="sng" algn="ctr">
+          <a:solidFill>
+            <a:schemeClr val="phClr"/>
+          </a:solidFill>
+          <a:prstDash val="solid"/>
+          <a:miter lim="800000"/>
+        </a:ln>
+        <a:ln w="19050" cap="flat" cmpd="sng" algn="ctr">
+          <a:solidFill>
+            <a:schemeClr val="phClr"/>
+          </a:solidFill>
+          <a:prstDash val="solid"/>
+          <a:miter lim="800000"/>
+        </a:ln>
+      </a:lnStyleLst>
+      <a:effectStyleLst>
+        <a:effectStyle>
+          <a:effectLst/>
+        </a:effectStyle>
+        <a:effectStyle>
+          <a:effectLst/>
+        </a:effectStyle>
+        <a:effectStyle>
+          <a:effectLst>
+            <a:outerShdw blurRad="57150" dist="19050" dir="5400000" algn="ctr" rotWithShape="0">
+              <a:srgbClr val="000000">
+                <a:alpha val="63000"/>
+              </a:srgbClr>
+            </a:outerShdw>
+          </a:effectLst>
+        </a:effectStyle>
+      </a:effectStyleLst>
+      <a:bgFillStyleLst>
+        <a:solidFill>
+          <a:schemeClr val="phClr"/>
+        </a:solidFill>
+        <a:solidFill>
+          <a:schemeClr val="phClr">
+            <a:tint val="95000"/>
+            <a:satMod val="170000"/>
+          </a:schemeClr>
+        </a:solidFill>
+        <a:gradFill rotWithShape="1">
+          <a:gsLst>
+            <a:gs pos="0">
+              <a:schemeClr val="phClr">
+                <a:tint val="93000"/>
+                <a:satMod val="150000"/>
+                <a:shade val="98000"/>
+                <a:lumMod val="102000"/>
+              </a:schemeClr>
+            </a:gs>
+            <a:gs pos="50000">
+              <a:schemeClr val="phClr">
+                <a:tint val="98000"/>
+                <a:satMod val="130000"/>
+                <a:shade val="90000"/>
+                <a:lumMod val="103000"/>
+              </a:schemeClr>
+            </a:gs>
+            <a:gs pos="100000">
+              <a:schemeClr val="phClr">
+                <a:shade val="63000"/>
+                <a:satMod val="120000"/>
+              </a:schemeClr>
+            </a:gs>
+          </a:gsLst>
+          <a:lin ang="5400000" scaled="0"/>
+        </a:gradFill>
+      </a:bgFillStyleLst>
+    </a:fmtScheme>
+  </a:themeElements>
+  <a:objectDefaults/>
+  <a:extraClrSchemeLst/>
+  <a:extLst>
+    <a:ext uri="{05A4C25C-085E-4340-85A3-A5531E510DB2}">
+      <thm15:themeFamily xmlns:thm15="http://schemas.microsoft.com/office/thememl/2012/main" name="Office Theme" id="{62F939B6-93AF-4DB8-9C6B-D6C7DFDC589F}" vid="{4A3C46E8-61CC-4603-A589-7422A47A8E4A}"/>
+    </a:ext>
+  </a:extLst>
+</a:theme>
 </file>
</xml_diff>